<commit_message>
Milestones and RIP updates
</commit_message>
<xml_diff>
--- a/Collaborator Meetings/2014_06_05 meeting.pptx
+++ b/Collaborator Meetings/2014_06_05 meeting.pptx
@@ -1337,6 +1337,13 @@
         </dgm:presLayoutVars>
       </dgm:prSet>
       <dgm:spPr/>
+      <dgm:t>
+        <a:bodyPr/>
+        <a:lstStyle/>
+        <a:p>
+          <a:endParaRPr lang="en-US"/>
+        </a:p>
+      </dgm:t>
     </dgm:pt>
     <dgm:pt modelId="{EFDEE7A1-868E-44EA-8C43-081E7A8C15C6}" type="pres">
       <dgm:prSet presAssocID="{51EC391D-3554-41AA-813C-F4A63148C692}" presName="composite" presStyleCnt="0"/>
@@ -1350,6 +1357,13 @@
         </dgm:presLayoutVars>
       </dgm:prSet>
       <dgm:spPr/>
+      <dgm:t>
+        <a:bodyPr/>
+        <a:lstStyle/>
+        <a:p>
+          <a:endParaRPr lang="en-US"/>
+        </a:p>
+      </dgm:t>
     </dgm:pt>
     <dgm:pt modelId="{519A2BC2-4E45-4DD8-945C-B47BC12E672E}" type="pres">
       <dgm:prSet presAssocID="{51EC391D-3554-41AA-813C-F4A63148C692}" presName="descendantText" presStyleLbl="alignAcc1" presStyleIdx="0" presStyleCnt="3">
@@ -1358,6 +1372,13 @@
         </dgm:presLayoutVars>
       </dgm:prSet>
       <dgm:spPr/>
+      <dgm:t>
+        <a:bodyPr/>
+        <a:lstStyle/>
+        <a:p>
+          <a:endParaRPr lang="en-US"/>
+        </a:p>
+      </dgm:t>
     </dgm:pt>
     <dgm:pt modelId="{A2C7446D-FE6D-40A5-BEDD-EB79281BE872}" type="pres">
       <dgm:prSet presAssocID="{C3DA8524-34EE-44C3-9407-FE7B2756B14E}" presName="sp" presStyleCnt="0"/>
@@ -1375,6 +1396,13 @@
         </dgm:presLayoutVars>
       </dgm:prSet>
       <dgm:spPr/>
+      <dgm:t>
+        <a:bodyPr/>
+        <a:lstStyle/>
+        <a:p>
+          <a:endParaRPr lang="en-US"/>
+        </a:p>
+      </dgm:t>
     </dgm:pt>
     <dgm:pt modelId="{8CED537A-A5DB-47AD-9610-CCA18EC825E7}" type="pres">
       <dgm:prSet presAssocID="{038B6B9D-35ED-4D21-9484-1B64347858F2}" presName="descendantText" presStyleLbl="alignAcc1" presStyleIdx="1" presStyleCnt="3">
@@ -1383,6 +1411,13 @@
         </dgm:presLayoutVars>
       </dgm:prSet>
       <dgm:spPr/>
+      <dgm:t>
+        <a:bodyPr/>
+        <a:lstStyle/>
+        <a:p>
+          <a:endParaRPr lang="en-US"/>
+        </a:p>
+      </dgm:t>
     </dgm:pt>
     <dgm:pt modelId="{A62FE67E-C5C4-47E2-8F9A-887B1A03B25F}" type="pres">
       <dgm:prSet presAssocID="{AE9ECEFC-24E0-48F6-97C0-6A2982E4A4EE}" presName="sp" presStyleCnt="0"/>
@@ -1400,6 +1435,13 @@
         </dgm:presLayoutVars>
       </dgm:prSet>
       <dgm:spPr/>
+      <dgm:t>
+        <a:bodyPr/>
+        <a:lstStyle/>
+        <a:p>
+          <a:endParaRPr lang="en-US"/>
+        </a:p>
+      </dgm:t>
     </dgm:pt>
     <dgm:pt modelId="{51E9AC10-C294-4B87-B34D-EA84E59765B3}" type="pres">
       <dgm:prSet presAssocID="{6F44C8BF-B26F-49A9-B0B2-6CADFD403C7F}" presName="descendantText" presStyleLbl="alignAcc1" presStyleIdx="2" presStyleCnt="3">
@@ -1426,8 +1468,8 @@
     <dgm:cxn modelId="{8FC961F8-21F4-4960-B543-ED2511565B56}" srcId="{0C632836-76A6-4D93-89AF-736A01878342}" destId="{51EC391D-3554-41AA-813C-F4A63148C692}" srcOrd="0" destOrd="0" parTransId="{73EDF42C-6132-4D85-8371-0D262CD5BDDD}" sibTransId="{C3DA8524-34EE-44C3-9407-FE7B2756B14E}"/>
     <dgm:cxn modelId="{1E3DB97F-85EF-45C9-AB41-94A4A9F06B85}" srcId="{038B6B9D-35ED-4D21-9484-1B64347858F2}" destId="{D7D70972-4993-4107-B2E3-8B6B63222784}" srcOrd="1" destOrd="0" parTransId="{133BE4C9-3F23-4338-9F6D-BA2FD194D018}" sibTransId="{EF2DFCE9-6E4F-4AC9-9E82-37035CB91DE2}"/>
     <dgm:cxn modelId="{4D2E5ACA-8EF0-48DD-9F63-2A043B2E6DBD}" srcId="{51EC391D-3554-41AA-813C-F4A63148C692}" destId="{99D8EF8B-0240-409C-859D-F1ADBF184622}" srcOrd="0" destOrd="0" parTransId="{653EE2B1-E196-4AC0-AB8A-5E2DCAD3025B}" sibTransId="{455C77AC-B49B-4415-B0D3-F38F0F22F1FA}"/>
+    <dgm:cxn modelId="{102BB4FA-17F4-4873-B7F1-C1CC0A4FFA09}" srcId="{51EC391D-3554-41AA-813C-F4A63148C692}" destId="{71B86838-053A-463E-8F15-8367EAF46B77}" srcOrd="2" destOrd="0" parTransId="{777F5AAE-74B4-4CCD-8C2B-0A7C05DF97E8}" sibTransId="{D6511D03-8D96-4B68-A430-B9AC6A4FD690}"/>
     <dgm:cxn modelId="{BB492910-8E0B-4185-BA37-711C1BB6DB3E}" type="presOf" srcId="{D7D70972-4993-4107-B2E3-8B6B63222784}" destId="{8CED537A-A5DB-47AD-9610-CCA18EC825E7}" srcOrd="0" destOrd="1" presId="urn:microsoft.com/office/officeart/2005/8/layout/chevron2"/>
-    <dgm:cxn modelId="{102BB4FA-17F4-4873-B7F1-C1CC0A4FFA09}" srcId="{51EC391D-3554-41AA-813C-F4A63148C692}" destId="{71B86838-053A-463E-8F15-8367EAF46B77}" srcOrd="2" destOrd="0" parTransId="{777F5AAE-74B4-4CCD-8C2B-0A7C05DF97E8}" sibTransId="{D6511D03-8D96-4B68-A430-B9AC6A4FD690}"/>
     <dgm:cxn modelId="{F11A488E-416F-4E3D-8D6A-F4C6B6B4A0B9}" type="presOf" srcId="{71B86838-053A-463E-8F15-8367EAF46B77}" destId="{519A2BC2-4E45-4DD8-945C-B47BC12E672E}" srcOrd="0" destOrd="2" presId="urn:microsoft.com/office/officeart/2005/8/layout/chevron2"/>
     <dgm:cxn modelId="{E879F01C-159E-4699-B9E7-E7F8C1133ABF}" type="presOf" srcId="{AC1F66FA-37F1-46C7-AE78-527FFD2FB8D5}" destId="{51E9AC10-C294-4B87-B34D-EA84E59765B3}" srcOrd="0" destOrd="1" presId="urn:microsoft.com/office/officeart/2005/8/layout/chevron2"/>
     <dgm:cxn modelId="{459B5124-3690-4785-AB43-44848F0BE9A1}" type="presOf" srcId="{937C6154-8AD0-48DF-BDEF-C5CC8D8D3102}" destId="{8CED537A-A5DB-47AD-9610-CCA18EC825E7}" srcOrd="0" destOrd="0" presId="urn:microsoft.com/office/officeart/2005/8/layout/chevron2"/>
@@ -1439,8 +1481,8 @@
     <dgm:cxn modelId="{033E6898-FE16-4B98-B433-AED258AA1692}" srcId="{6F44C8BF-B26F-49A9-B0B2-6CADFD403C7F}" destId="{2E80D11E-F60F-4AAC-A797-C2B08CC484D5}" srcOrd="2" destOrd="0" parTransId="{5930E10A-AD1C-475B-AE70-879737E0CB10}" sibTransId="{19AA80BE-ABF0-4900-958E-E3F9A044AEC8}"/>
     <dgm:cxn modelId="{A15067E1-E51F-425B-8C59-F0FE9F6C2DFD}" type="presOf" srcId="{0C632836-76A6-4D93-89AF-736A01878342}" destId="{0933F0FE-F1D0-4385-B0BD-4EEFB52054F9}" srcOrd="0" destOrd="0" presId="urn:microsoft.com/office/officeart/2005/8/layout/chevron2"/>
     <dgm:cxn modelId="{5C9C7179-790D-4C79-B5D0-D77EDE6DB56C}" type="presOf" srcId="{99D8EF8B-0240-409C-859D-F1ADBF184622}" destId="{519A2BC2-4E45-4DD8-945C-B47BC12E672E}" srcOrd="0" destOrd="0" presId="urn:microsoft.com/office/officeart/2005/8/layout/chevron2"/>
+    <dgm:cxn modelId="{E05DBA71-E5A0-4953-8DF7-9E9C2604F597}" srcId="{6F44C8BF-B26F-49A9-B0B2-6CADFD403C7F}" destId="{AC1F66FA-37F1-46C7-AE78-527FFD2FB8D5}" srcOrd="1" destOrd="0" parTransId="{52D659B5-098E-4664-A3EE-794249E04B47}" sibTransId="{95A8287D-94FB-471E-8AD1-4DB5CFCFF08C}"/>
     <dgm:cxn modelId="{00170125-3C09-414B-90CC-AA78F312FE55}" srcId="{6F44C8BF-B26F-49A9-B0B2-6CADFD403C7F}" destId="{C80DF31B-258E-462A-BF24-C8F725BB8BE4}" srcOrd="0" destOrd="0" parTransId="{BE65ED89-8306-46D5-B92F-04F63D3FF6C9}" sibTransId="{E47BC7E5-689B-4514-8300-9A0324CBA167}"/>
-    <dgm:cxn modelId="{E05DBA71-E5A0-4953-8DF7-9E9C2604F597}" srcId="{6F44C8BF-B26F-49A9-B0B2-6CADFD403C7F}" destId="{AC1F66FA-37F1-46C7-AE78-527FFD2FB8D5}" srcOrd="1" destOrd="0" parTransId="{52D659B5-098E-4664-A3EE-794249E04B47}" sibTransId="{95A8287D-94FB-471E-8AD1-4DB5CFCFF08C}"/>
     <dgm:cxn modelId="{5BEB64CA-DBD9-4418-A15C-BFC9BCE05BFA}" type="presOf" srcId="{51EC391D-3554-41AA-813C-F4A63148C692}" destId="{0F12E7A3-6885-461D-849F-CEB0EB549CF7}" srcOrd="0" destOrd="0" presId="urn:microsoft.com/office/officeart/2005/8/layout/chevron2"/>
     <dgm:cxn modelId="{9AB18030-0BCA-41A0-A66B-598AB12FB280}" srcId="{0C632836-76A6-4D93-89AF-736A01878342}" destId="{038B6B9D-35ED-4D21-9484-1B64347858F2}" srcOrd="1" destOrd="0" parTransId="{E2C175F7-BAFE-4810-B34E-B24ED1C8A72B}" sibTransId="{AE9ECEFC-24E0-48F6-97C0-6A2982E4A4EE}"/>
     <dgm:cxn modelId="{7454194A-BCA5-4123-8F8F-ADF0C0785CE5}" type="presParOf" srcId="{0933F0FE-F1D0-4385-B0BD-4EEFB52054F9}" destId="{EFDEE7A1-868E-44EA-8C43-081E7A8C15C6}" srcOrd="0" destOrd="0" presId="urn:microsoft.com/office/officeart/2005/8/layout/chevron2"/>
@@ -3425,7 +3467,7 @@
           <a:p>
             <a:fld id="{446222E5-0CAA-434E-860C-63EB29ADCB97}" type="datetimeFigureOut">
               <a:rPr lang="en-US" smtClean="0"/>
-              <a:t>6/6/2014</a:t>
+              <a:t>3/9/2015</a:t>
             </a:fld>
             <a:endParaRPr lang="en-US"/>
           </a:p>
@@ -4042,7 +4084,7 @@
           <a:p>
             <a:fld id="{17848C7B-7776-4099-9DD9-22DC6CAB5932}" type="datetimeFigureOut">
               <a:rPr lang="en-US" smtClean="0"/>
-              <a:t>6/6/2014</a:t>
+              <a:t>3/9/2015</a:t>
             </a:fld>
             <a:endParaRPr lang="en-US"/>
           </a:p>
@@ -4212,7 +4254,7 @@
           <a:p>
             <a:fld id="{17848C7B-7776-4099-9DD9-22DC6CAB5932}" type="datetimeFigureOut">
               <a:rPr lang="en-US" smtClean="0"/>
-              <a:t>6/6/2014</a:t>
+              <a:t>3/9/2015</a:t>
             </a:fld>
             <a:endParaRPr lang="en-US"/>
           </a:p>
@@ -4392,7 +4434,7 @@
           <a:p>
             <a:fld id="{17848C7B-7776-4099-9DD9-22DC6CAB5932}" type="datetimeFigureOut">
               <a:rPr lang="en-US" smtClean="0"/>
-              <a:t>6/6/2014</a:t>
+              <a:t>3/9/2015</a:t>
             </a:fld>
             <a:endParaRPr lang="en-US"/>
           </a:p>
@@ -4562,7 +4604,7 @@
           <a:p>
             <a:fld id="{17848C7B-7776-4099-9DD9-22DC6CAB5932}" type="datetimeFigureOut">
               <a:rPr lang="en-US" smtClean="0"/>
-              <a:t>6/6/2014</a:t>
+              <a:t>3/9/2015</a:t>
             </a:fld>
             <a:endParaRPr lang="en-US"/>
           </a:p>
@@ -4808,7 +4850,7 @@
           <a:p>
             <a:fld id="{17848C7B-7776-4099-9DD9-22DC6CAB5932}" type="datetimeFigureOut">
               <a:rPr lang="en-US" smtClean="0"/>
-              <a:t>6/6/2014</a:t>
+              <a:t>3/9/2015</a:t>
             </a:fld>
             <a:endParaRPr lang="en-US"/>
           </a:p>
@@ -5096,7 +5138,7 @@
           <a:p>
             <a:fld id="{17848C7B-7776-4099-9DD9-22DC6CAB5932}" type="datetimeFigureOut">
               <a:rPr lang="en-US" smtClean="0"/>
-              <a:t>6/6/2014</a:t>
+              <a:t>3/9/2015</a:t>
             </a:fld>
             <a:endParaRPr lang="en-US"/>
           </a:p>
@@ -5518,7 +5560,7 @@
           <a:p>
             <a:fld id="{17848C7B-7776-4099-9DD9-22DC6CAB5932}" type="datetimeFigureOut">
               <a:rPr lang="en-US" smtClean="0"/>
-              <a:t>6/6/2014</a:t>
+              <a:t>3/9/2015</a:t>
             </a:fld>
             <a:endParaRPr lang="en-US"/>
           </a:p>
@@ -5636,7 +5678,7 @@
           <a:p>
             <a:fld id="{17848C7B-7776-4099-9DD9-22DC6CAB5932}" type="datetimeFigureOut">
               <a:rPr lang="en-US" smtClean="0"/>
-              <a:t>6/6/2014</a:t>
+              <a:t>3/9/2015</a:t>
             </a:fld>
             <a:endParaRPr lang="en-US"/>
           </a:p>
@@ -5731,7 +5773,7 @@
           <a:p>
             <a:fld id="{17848C7B-7776-4099-9DD9-22DC6CAB5932}" type="datetimeFigureOut">
               <a:rPr lang="en-US" smtClean="0"/>
-              <a:t>6/6/2014</a:t>
+              <a:t>3/9/2015</a:t>
             </a:fld>
             <a:endParaRPr lang="en-US"/>
           </a:p>
@@ -6008,7 +6050,7 @@
           <a:p>
             <a:fld id="{17848C7B-7776-4099-9DD9-22DC6CAB5932}" type="datetimeFigureOut">
               <a:rPr lang="en-US" smtClean="0"/>
-              <a:t>6/6/2014</a:t>
+              <a:t>3/9/2015</a:t>
             </a:fld>
             <a:endParaRPr lang="en-US"/>
           </a:p>
@@ -6261,7 +6303,7 @@
           <a:p>
             <a:fld id="{17848C7B-7776-4099-9DD9-22DC6CAB5932}" type="datetimeFigureOut">
               <a:rPr lang="en-US" smtClean="0"/>
-              <a:t>6/6/2014</a:t>
+              <a:t>3/9/2015</a:t>
             </a:fld>
             <a:endParaRPr lang="en-US"/>
           </a:p>
@@ -6474,7 +6516,7 @@
           <a:p>
             <a:fld id="{17848C7B-7776-4099-9DD9-22DC6CAB5932}" type="datetimeFigureOut">
               <a:rPr lang="en-US" smtClean="0"/>
-              <a:t>6/6/2014</a:t>
+              <a:t>3/9/2015</a:t>
             </a:fld>
             <a:endParaRPr lang="en-US"/>
           </a:p>
@@ -7715,11 +7757,7 @@
           <a:p>
             <a:r>
               <a:rPr lang="en-US" dirty="0" smtClean="0"/>
-              <a:t>Modeling issues to </a:t>
-            </a:r>
-            <a:r>
-              <a:rPr lang="en-US" dirty="0" smtClean="0"/>
-              <a:t>address:</a:t>
+              <a:t>Modeling issues to address:</a:t>
             </a:r>
           </a:p>
           <a:p>
@@ -7748,7 +7786,6 @@
               <a:rPr lang="en-US" dirty="0" smtClean="0"/>
               <a:t> in the media</a:t>
             </a:r>
-            <a:endParaRPr lang="en-US" dirty="0" smtClean="0"/>
           </a:p>
           <a:p>
             <a:r>
@@ -7777,7 +7814,6 @@
               <a:rPr lang="en-US" dirty="0" smtClean="0"/>
               <a:t>Can tune with ATP maintenance</a:t>
             </a:r>
-            <a:endParaRPr lang="en-US" dirty="0" smtClean="0"/>
           </a:p>
           <a:p>
             <a:endParaRPr lang="en-US" dirty="0"/>
@@ -11807,11 +11843,7 @@
           <a:p>
             <a:r>
               <a:rPr lang="en-US" dirty="0" smtClean="0"/>
-              <a:t>Model </a:t>
-            </a:r>
-            <a:r>
-              <a:rPr lang="en-US" dirty="0" smtClean="0"/>
-              <a:t>Updates</a:t>
+              <a:t>Model Updates</a:t>
             </a:r>
             <a:endParaRPr lang="en-US" dirty="0"/>
           </a:p>

</xml_diff>